<commit_message>
small change to session3 slides
</commit_message>
<xml_diff>
--- a/Session03/Session3_Slides.pptx
+++ b/Session03/Session3_Slides.pptx
@@ -10669,7 +10669,7 @@
           </a:ln>
           <a:extLst>
             <a:ext uri="{C572A759-6A51-4108-AA02-DFA0A04FC94B}">
-              <ma14:wrappingTextBoxFlag xmlns:ma14="http://schemas.microsoft.com/office/mac/drawingml/2011/main" xmlns="" val="1"/>
+              <ma14:wrappingTextBoxFlag xmlns="" xmlns:ma14="http://schemas.microsoft.com/office/mac/drawingml/2011/main" val="1"/>
             </a:ext>
           </a:extLst>
         </p:spPr>
@@ -10708,7 +10708,7 @@
           </a:ln>
           <a:extLst>
             <a:ext uri="{C572A759-6A51-4108-AA02-DFA0A04FC94B}">
-              <ma14:wrappingTextBoxFlag xmlns:ma14="http://schemas.microsoft.com/office/mac/drawingml/2011/main" xmlns="" val="1"/>
+              <ma14:wrappingTextBoxFlag xmlns="" xmlns:ma14="http://schemas.microsoft.com/office/mac/drawingml/2011/main" val="1"/>
             </a:ext>
           </a:extLst>
         </p:spPr>
@@ -11772,7 +11772,7 @@
           </a:ln>
           <a:extLst>
             <a:ext uri="{C572A759-6A51-4108-AA02-DFA0A04FC94B}">
-              <ma14:wrappingTextBoxFlag xmlns:ma14="http://schemas.microsoft.com/office/mac/drawingml/2011/main" xmlns="" val="1"/>
+              <ma14:wrappingTextBoxFlag xmlns="" xmlns:ma14="http://schemas.microsoft.com/office/mac/drawingml/2011/main" val="1"/>
             </a:ext>
           </a:extLst>
         </p:spPr>
@@ -11811,7 +11811,7 @@
           </a:ln>
           <a:extLst>
             <a:ext uri="{C572A759-6A51-4108-AA02-DFA0A04FC94B}">
-              <ma14:wrappingTextBoxFlag xmlns:ma14="http://schemas.microsoft.com/office/mac/drawingml/2011/main" xmlns="" val="1"/>
+              <ma14:wrappingTextBoxFlag xmlns="" xmlns:ma14="http://schemas.microsoft.com/office/mac/drawingml/2011/main" val="1"/>
             </a:ext>
           </a:extLst>
         </p:spPr>
@@ -12906,7 +12906,7 @@
           </a:ln>
           <a:extLst>
             <a:ext uri="{C572A759-6A51-4108-AA02-DFA0A04FC94B}">
-              <ma14:wrappingTextBoxFlag xmlns:ma14="http://schemas.microsoft.com/office/mac/drawingml/2011/main" xmlns="" val="1"/>
+              <ma14:wrappingTextBoxFlag xmlns="" xmlns:ma14="http://schemas.microsoft.com/office/mac/drawingml/2011/main" val="1"/>
             </a:ext>
           </a:extLst>
         </p:spPr>
@@ -12999,7 +12999,7 @@
           </a:ln>
           <a:extLst>
             <a:ext uri="{C572A759-6A51-4108-AA02-DFA0A04FC94B}">
-              <ma14:wrappingTextBoxFlag xmlns:ma14="http://schemas.microsoft.com/office/mac/drawingml/2011/main" xmlns="" val="1"/>
+              <ma14:wrappingTextBoxFlag xmlns="" xmlns:ma14="http://schemas.microsoft.com/office/mac/drawingml/2011/main" val="1"/>
             </a:ext>
           </a:extLst>
         </p:spPr>
@@ -13184,7 +13184,7 @@
           </a:ln>
           <a:extLst>
             <a:ext uri="{C572A759-6A51-4108-AA02-DFA0A04FC94B}">
-              <ma14:wrappingTextBoxFlag xmlns:ma14="http://schemas.microsoft.com/office/mac/drawingml/2011/main" xmlns="" val="1"/>
+              <ma14:wrappingTextBoxFlag xmlns="" xmlns:ma14="http://schemas.microsoft.com/office/mac/drawingml/2011/main" val="1"/>
             </a:ext>
           </a:extLst>
         </p:spPr>
@@ -13228,7 +13228,7 @@
           </a:ln>
           <a:extLst>
             <a:ext uri="{C572A759-6A51-4108-AA02-DFA0A04FC94B}">
-              <ma14:wrappingTextBoxFlag xmlns:ma14="http://schemas.microsoft.com/office/mac/drawingml/2011/main" xmlns="" val="1"/>
+              <ma14:wrappingTextBoxFlag xmlns="" xmlns:ma14="http://schemas.microsoft.com/office/mac/drawingml/2011/main" val="1"/>
             </a:ext>
           </a:extLst>
         </p:spPr>
@@ -13321,7 +13321,7 @@
           </a:ln>
           <a:extLst>
             <a:ext uri="{C572A759-6A51-4108-AA02-DFA0A04FC94B}">
-              <ma14:wrappingTextBoxFlag xmlns:ma14="http://schemas.microsoft.com/office/mac/drawingml/2011/main" xmlns="" val="1"/>
+              <ma14:wrappingTextBoxFlag xmlns="" xmlns:ma14="http://schemas.microsoft.com/office/mac/drawingml/2011/main" val="1"/>
             </a:ext>
           </a:extLst>
         </p:spPr>
@@ -13413,7 +13413,7 @@
           </a:ln>
           <a:extLst>
             <a:ext uri="{C572A759-6A51-4108-AA02-DFA0A04FC94B}">
-              <ma14:wrappingTextBoxFlag xmlns:ma14="http://schemas.microsoft.com/office/mac/drawingml/2011/main" xmlns="" val="1"/>
+              <ma14:wrappingTextBoxFlag xmlns="" xmlns:ma14="http://schemas.microsoft.com/office/mac/drawingml/2011/main" val="1"/>
             </a:ext>
           </a:extLst>
         </p:spPr>
@@ -13518,7 +13518,7 @@
           </a:ln>
           <a:extLst>
             <a:ext uri="{C572A759-6A51-4108-AA02-DFA0A04FC94B}">
-              <ma14:wrappingTextBoxFlag xmlns:ma14="http://schemas.microsoft.com/office/mac/drawingml/2011/main" xmlns="" val="1"/>
+              <ma14:wrappingTextBoxFlag xmlns="" xmlns:ma14="http://schemas.microsoft.com/office/mac/drawingml/2011/main" val="1"/>
             </a:ext>
           </a:extLst>
         </p:spPr>
@@ -13679,7 +13679,7 @@
           </a:ln>
           <a:extLst>
             <a:ext uri="{C572A759-6A51-4108-AA02-DFA0A04FC94B}">
-              <ma14:wrappingTextBoxFlag xmlns:ma14="http://schemas.microsoft.com/office/mac/drawingml/2011/main" xmlns="" val="1"/>
+              <ma14:wrappingTextBoxFlag xmlns="" xmlns:ma14="http://schemas.microsoft.com/office/mac/drawingml/2011/main" val="1"/>
             </a:ext>
           </a:extLst>
         </p:spPr>
@@ -13827,7 +13827,7 @@
           </a:ln>
           <a:extLst>
             <a:ext uri="{C572A759-6A51-4108-AA02-DFA0A04FC94B}">
-              <ma14:wrappingTextBoxFlag xmlns:ma14="http://schemas.microsoft.com/office/mac/drawingml/2011/main" xmlns="" val="1"/>
+              <ma14:wrappingTextBoxFlag xmlns="" xmlns:ma14="http://schemas.microsoft.com/office/mac/drawingml/2011/main" val="1"/>
             </a:ext>
           </a:extLst>
         </p:spPr>
@@ -13932,7 +13932,7 @@
           </a:ln>
           <a:extLst>
             <a:ext uri="{C572A759-6A51-4108-AA02-DFA0A04FC94B}">
-              <ma14:wrappingTextBoxFlag xmlns:ma14="http://schemas.microsoft.com/office/mac/drawingml/2011/main" xmlns="" val="1"/>
+              <ma14:wrappingTextBoxFlag xmlns="" xmlns:ma14="http://schemas.microsoft.com/office/mac/drawingml/2011/main" val="1"/>
             </a:ext>
           </a:extLst>
         </p:spPr>
@@ -14048,7 +14048,7 @@
           </a:ln>
           <a:extLst>
             <a:ext uri="{C572A759-6A51-4108-AA02-DFA0A04FC94B}">
-              <ma14:wrappingTextBoxFlag xmlns:ma14="http://schemas.microsoft.com/office/mac/drawingml/2011/main" xmlns="" val="1"/>
+              <ma14:wrappingTextBoxFlag xmlns="" xmlns:ma14="http://schemas.microsoft.com/office/mac/drawingml/2011/main" val="1"/>
             </a:ext>
           </a:extLst>
         </p:spPr>
@@ -14760,7 +14760,7 @@
           </a:ln>
           <a:extLst>
             <a:ext uri="{C572A759-6A51-4108-AA02-DFA0A04FC94B}">
-              <ma14:wrappingTextBoxFlag xmlns:ma14="http://schemas.microsoft.com/office/mac/drawingml/2011/main" xmlns="" val="1"/>
+              <ma14:wrappingTextBoxFlag xmlns="" xmlns:ma14="http://schemas.microsoft.com/office/mac/drawingml/2011/main" val="1"/>
             </a:ext>
           </a:extLst>
         </p:spPr>
@@ -14876,7 +14876,7 @@
           </a:ln>
           <a:extLst>
             <a:ext uri="{C572A759-6A51-4108-AA02-DFA0A04FC94B}">
-              <ma14:wrappingTextBoxFlag xmlns:ma14="http://schemas.microsoft.com/office/mac/drawingml/2011/main" xmlns="" val="1"/>
+              <ma14:wrappingTextBoxFlag xmlns="" xmlns:ma14="http://schemas.microsoft.com/office/mac/drawingml/2011/main" val="1"/>
             </a:ext>
           </a:extLst>
         </p:spPr>
@@ -14994,7 +14994,7 @@
           </a:ln>
           <a:extLst>
             <a:ext uri="{C572A759-6A51-4108-AA02-DFA0A04FC94B}">
-              <ma14:wrappingTextBoxFlag xmlns:ma14="http://schemas.microsoft.com/office/mac/drawingml/2011/main" xmlns="" val="1"/>
+              <ma14:wrappingTextBoxFlag xmlns="" xmlns:ma14="http://schemas.microsoft.com/office/mac/drawingml/2011/main" val="1"/>
             </a:ext>
           </a:extLst>
         </p:spPr>
@@ -15050,7 +15050,7 @@
           </a:ln>
           <a:extLst>
             <a:ext uri="{C572A759-6A51-4108-AA02-DFA0A04FC94B}">
-              <ma14:wrappingTextBoxFlag xmlns:ma14="http://schemas.microsoft.com/office/mac/drawingml/2011/main" xmlns="" val="1"/>
+              <ma14:wrappingTextBoxFlag xmlns="" xmlns:ma14="http://schemas.microsoft.com/office/mac/drawingml/2011/main" val="1"/>
             </a:ext>
           </a:extLst>
         </p:spPr>
@@ -15097,7 +15097,7 @@
           </a:ln>
           <a:extLst>
             <a:ext uri="{C572A759-6A51-4108-AA02-DFA0A04FC94B}">
-              <ma14:wrappingTextBoxFlag xmlns:ma14="http://schemas.microsoft.com/office/mac/drawingml/2011/main" xmlns="" val="1"/>
+              <ma14:wrappingTextBoxFlag xmlns="" xmlns:ma14="http://schemas.microsoft.com/office/mac/drawingml/2011/main" val="1"/>
             </a:ext>
           </a:extLst>
         </p:spPr>
@@ -15206,7 +15206,7 @@
           </a:ln>
           <a:extLst>
             <a:ext uri="{C572A759-6A51-4108-AA02-DFA0A04FC94B}">
-              <ma14:wrappingTextBoxFlag xmlns:ma14="http://schemas.microsoft.com/office/mac/drawingml/2011/main" xmlns="" val="1"/>
+              <ma14:wrappingTextBoxFlag xmlns="" xmlns:ma14="http://schemas.microsoft.com/office/mac/drawingml/2011/main" val="1"/>
             </a:ext>
           </a:extLst>
         </p:spPr>
@@ -15370,7 +15370,7 @@
           </a:ln>
           <a:extLst>
             <a:ext uri="{C572A759-6A51-4108-AA02-DFA0A04FC94B}">
-              <ma14:wrappingTextBoxFlag xmlns:ma14="http://schemas.microsoft.com/office/mac/drawingml/2011/main" xmlns="" val="1"/>
+              <ma14:wrappingTextBoxFlag xmlns="" xmlns:ma14="http://schemas.microsoft.com/office/mac/drawingml/2011/main" val="1"/>
             </a:ext>
           </a:extLst>
         </p:spPr>
@@ -15626,7 +15626,7 @@
           </a:ln>
           <a:extLst>
             <a:ext uri="{C572A759-6A51-4108-AA02-DFA0A04FC94B}">
-              <ma14:wrappingTextBoxFlag xmlns:ma14="http://schemas.microsoft.com/office/mac/drawingml/2011/main" xmlns="" val="1"/>
+              <ma14:wrappingTextBoxFlag xmlns="" xmlns:ma14="http://schemas.microsoft.com/office/mac/drawingml/2011/main" val="1"/>
             </a:ext>
           </a:extLst>
         </p:spPr>
@@ -15779,7 +15779,7 @@
           </a:ln>
           <a:extLst>
             <a:ext uri="{C572A759-6A51-4108-AA02-DFA0A04FC94B}">
-              <ma14:wrappingTextBoxFlag xmlns:ma14="http://schemas.microsoft.com/office/mac/drawingml/2011/main" xmlns="" val="1"/>
+              <ma14:wrappingTextBoxFlag xmlns="" xmlns:ma14="http://schemas.microsoft.com/office/mac/drawingml/2011/main" val="1"/>
             </a:ext>
           </a:extLst>
         </p:spPr>
@@ -15943,7 +15943,7 @@
           </a:ln>
           <a:extLst>
             <a:ext uri="{C572A759-6A51-4108-AA02-DFA0A04FC94B}">
-              <ma14:wrappingTextBoxFlag xmlns:ma14="http://schemas.microsoft.com/office/mac/drawingml/2011/main" xmlns="" val="1"/>
+              <ma14:wrappingTextBoxFlag xmlns="" xmlns:ma14="http://schemas.microsoft.com/office/mac/drawingml/2011/main" val="1"/>
             </a:ext>
           </a:extLst>
         </p:spPr>
@@ -16083,7 +16083,7 @@
           </a:ln>
           <a:extLst>
             <a:ext uri="{C572A759-6A51-4108-AA02-DFA0A04FC94B}">
-              <ma14:wrappingTextBoxFlag xmlns:ma14="http://schemas.microsoft.com/office/mac/drawingml/2011/main" xmlns="" val="1"/>
+              <ma14:wrappingTextBoxFlag xmlns="" xmlns:ma14="http://schemas.microsoft.com/office/mac/drawingml/2011/main" val="1"/>
             </a:ext>
           </a:extLst>
         </p:spPr>
@@ -16192,7 +16192,7 @@
           </a:ln>
           <a:extLst>
             <a:ext uri="{C572A759-6A51-4108-AA02-DFA0A04FC94B}">
-              <ma14:wrappingTextBoxFlag xmlns:ma14="http://schemas.microsoft.com/office/mac/drawingml/2011/main" xmlns="" val="1"/>
+              <ma14:wrappingTextBoxFlag xmlns="" xmlns:ma14="http://schemas.microsoft.com/office/mac/drawingml/2011/main" val="1"/>
             </a:ext>
           </a:extLst>
         </p:spPr>
@@ -16370,7 +16370,7 @@
           </a:ln>
           <a:extLst>
             <a:ext uri="{C572A759-6A51-4108-AA02-DFA0A04FC94B}">
-              <ma14:wrappingTextBoxFlag xmlns:ma14="http://schemas.microsoft.com/office/mac/drawingml/2011/main" xmlns="" val="1"/>
+              <ma14:wrappingTextBoxFlag xmlns="" xmlns:ma14="http://schemas.microsoft.com/office/mac/drawingml/2011/main" val="1"/>
             </a:ext>
           </a:extLst>
         </p:spPr>
@@ -16417,7 +16417,7 @@
           </a:ln>
           <a:extLst>
             <a:ext uri="{C572A759-6A51-4108-AA02-DFA0A04FC94B}">
-              <ma14:wrappingTextBoxFlag xmlns:ma14="http://schemas.microsoft.com/office/mac/drawingml/2011/main" xmlns="" val="1"/>
+              <ma14:wrappingTextBoxFlag xmlns="" xmlns:ma14="http://schemas.microsoft.com/office/mac/drawingml/2011/main" val="1"/>
             </a:ext>
           </a:extLst>
         </p:spPr>
@@ -16604,7 +16604,7 @@
           </a:ln>
           <a:extLst>
             <a:ext uri="{C572A759-6A51-4108-AA02-DFA0A04FC94B}">
-              <ma14:wrappingTextBoxFlag xmlns:ma14="http://schemas.microsoft.com/office/mac/drawingml/2011/main" xmlns="" val="1"/>
+              <ma14:wrappingTextBoxFlag xmlns="" xmlns:ma14="http://schemas.microsoft.com/office/mac/drawingml/2011/main" val="1"/>
             </a:ext>
           </a:extLst>
         </p:spPr>
@@ -16820,7 +16820,7 @@
           </a:ln>
           <a:extLst>
             <a:ext uri="{C572A759-6A51-4108-AA02-DFA0A04FC94B}">
-              <ma14:wrappingTextBoxFlag xmlns:ma14="http://schemas.microsoft.com/office/mac/drawingml/2011/main" xmlns="" val="1"/>
+              <ma14:wrappingTextBoxFlag xmlns="" xmlns:ma14="http://schemas.microsoft.com/office/mac/drawingml/2011/main" val="1"/>
             </a:ext>
           </a:extLst>
         </p:spPr>
@@ -16867,7 +16867,7 @@
           </a:ln>
           <a:extLst>
             <a:ext uri="{C572A759-6A51-4108-AA02-DFA0A04FC94B}">
-              <ma14:wrappingTextBoxFlag xmlns:ma14="http://schemas.microsoft.com/office/mac/drawingml/2011/main" xmlns="" val="1"/>
+              <ma14:wrappingTextBoxFlag xmlns="" xmlns:ma14="http://schemas.microsoft.com/office/mac/drawingml/2011/main" val="1"/>
             </a:ext>
           </a:extLst>
         </p:spPr>
@@ -16914,7 +16914,7 @@
           </a:ln>
           <a:extLst>
             <a:ext uri="{C572A759-6A51-4108-AA02-DFA0A04FC94B}">
-              <ma14:wrappingTextBoxFlag xmlns:ma14="http://schemas.microsoft.com/office/mac/drawingml/2011/main" xmlns="" val="1"/>
+              <ma14:wrappingTextBoxFlag xmlns="" xmlns:ma14="http://schemas.microsoft.com/office/mac/drawingml/2011/main" val="1"/>
             </a:ext>
           </a:extLst>
         </p:spPr>
@@ -17764,7 +17764,7 @@
           </a:ln>
           <a:extLst>
             <a:ext uri="{C572A759-6A51-4108-AA02-DFA0A04FC94B}">
-              <ma14:wrappingTextBoxFlag xmlns:ma14="http://schemas.microsoft.com/office/mac/drawingml/2011/main" xmlns="" val="1"/>
+              <ma14:wrappingTextBoxFlag xmlns="" xmlns:ma14="http://schemas.microsoft.com/office/mac/drawingml/2011/main" val="1"/>
             </a:ext>
           </a:extLst>
         </p:spPr>
@@ -17811,7 +17811,7 @@
           </a:ln>
           <a:extLst>
             <a:ext uri="{C572A759-6A51-4108-AA02-DFA0A04FC94B}">
-              <ma14:wrappingTextBoxFlag xmlns:ma14="http://schemas.microsoft.com/office/mac/drawingml/2011/main" xmlns="" val="1"/>
+              <ma14:wrappingTextBoxFlag xmlns="" xmlns:ma14="http://schemas.microsoft.com/office/mac/drawingml/2011/main" val="1"/>
             </a:ext>
           </a:extLst>
         </p:spPr>
@@ -18330,7 +18330,7 @@
           </a:ln>
           <a:extLst>
             <a:ext uri="{C572A759-6A51-4108-AA02-DFA0A04FC94B}">
-              <ma14:wrappingTextBoxFlag xmlns:ma14="http://schemas.microsoft.com/office/mac/drawingml/2011/main" xmlns="" val="1"/>
+              <ma14:wrappingTextBoxFlag xmlns="" xmlns:ma14="http://schemas.microsoft.com/office/mac/drawingml/2011/main" val="1"/>
             </a:ext>
           </a:extLst>
         </p:spPr>
@@ -18436,7 +18436,7 @@
           </a:ln>
           <a:extLst>
             <a:ext uri="{C572A759-6A51-4108-AA02-DFA0A04FC94B}">
-              <ma14:wrappingTextBoxFlag xmlns:ma14="http://schemas.microsoft.com/office/mac/drawingml/2011/main" xmlns="" val="1"/>
+              <ma14:wrappingTextBoxFlag xmlns="" xmlns:ma14="http://schemas.microsoft.com/office/mac/drawingml/2011/main" val="1"/>
             </a:ext>
           </a:extLst>
         </p:spPr>
@@ -18659,7 +18659,7 @@
           </a:ln>
           <a:extLst>
             <a:ext uri="{C572A759-6A51-4108-AA02-DFA0A04FC94B}">
-              <ma14:wrappingTextBoxFlag xmlns:ma14="http://schemas.microsoft.com/office/mac/drawingml/2011/main" xmlns="" val="1"/>
+              <ma14:wrappingTextBoxFlag xmlns="" xmlns:ma14="http://schemas.microsoft.com/office/mac/drawingml/2011/main" val="1"/>
             </a:ext>
           </a:extLst>
         </p:spPr>
@@ -18706,7 +18706,7 @@
           </a:ln>
           <a:extLst>
             <a:ext uri="{C572A759-6A51-4108-AA02-DFA0A04FC94B}">
-              <ma14:wrappingTextBoxFlag xmlns:ma14="http://schemas.microsoft.com/office/mac/drawingml/2011/main" xmlns="" val="1"/>
+              <ma14:wrappingTextBoxFlag xmlns="" xmlns:ma14="http://schemas.microsoft.com/office/mac/drawingml/2011/main" val="1"/>
             </a:ext>
           </a:extLst>
         </p:spPr>
@@ -18872,7 +18872,7 @@
           </a:ln>
           <a:extLst>
             <a:ext uri="{C572A759-6A51-4108-AA02-DFA0A04FC94B}">
-              <ma14:wrappingTextBoxFlag xmlns:ma14="http://schemas.microsoft.com/office/mac/drawingml/2011/main" xmlns="" val="1"/>
+              <ma14:wrappingTextBoxFlag xmlns="" xmlns:ma14="http://schemas.microsoft.com/office/mac/drawingml/2011/main" val="1"/>
             </a:ext>
           </a:extLst>
         </p:spPr>
@@ -18965,7 +18965,7 @@
           </a:ln>
           <a:extLst>
             <a:ext uri="{C572A759-6A51-4108-AA02-DFA0A04FC94B}">
-              <ma14:wrappingTextBoxFlag xmlns:ma14="http://schemas.microsoft.com/office/mac/drawingml/2011/main" xmlns="" val="1"/>
+              <ma14:wrappingTextBoxFlag xmlns="" xmlns:ma14="http://schemas.microsoft.com/office/mac/drawingml/2011/main" val="1"/>
             </a:ext>
           </a:extLst>
         </p:spPr>
@@ -19012,7 +19012,7 @@
           </a:ln>
           <a:extLst>
             <a:ext uri="{C572A759-6A51-4108-AA02-DFA0A04FC94B}">
-              <ma14:wrappingTextBoxFlag xmlns:ma14="http://schemas.microsoft.com/office/mac/drawingml/2011/main" xmlns="" val="1"/>
+              <ma14:wrappingTextBoxFlag xmlns="" xmlns:ma14="http://schemas.microsoft.com/office/mac/drawingml/2011/main" val="1"/>
             </a:ext>
           </a:extLst>
         </p:spPr>
@@ -19059,7 +19059,7 @@
           </a:ln>
           <a:extLst>
             <a:ext uri="{C572A759-6A51-4108-AA02-DFA0A04FC94B}">
-              <ma14:wrappingTextBoxFlag xmlns:ma14="http://schemas.microsoft.com/office/mac/drawingml/2011/main" xmlns="" val="1"/>
+              <ma14:wrappingTextBoxFlag xmlns="" xmlns:ma14="http://schemas.microsoft.com/office/mac/drawingml/2011/main" val="1"/>
             </a:ext>
           </a:extLst>
         </p:spPr>
@@ -19315,7 +19315,7 @@
           </a:ln>
           <a:extLst>
             <a:ext uri="{C572A759-6A51-4108-AA02-DFA0A04FC94B}">
-              <ma14:wrappingTextBoxFlag xmlns:ma14="http://schemas.microsoft.com/office/mac/drawingml/2011/main" xmlns="" val="1"/>
+              <ma14:wrappingTextBoxFlag xmlns="" xmlns:ma14="http://schemas.microsoft.com/office/mac/drawingml/2011/main" val="1"/>
             </a:ext>
           </a:extLst>
         </p:spPr>
@@ -19564,7 +19564,7 @@
           </a:ln>
           <a:extLst>
             <a:ext uri="{C572A759-6A51-4108-AA02-DFA0A04FC94B}">
-              <ma14:wrappingTextBoxFlag xmlns:ma14="http://schemas.microsoft.com/office/mac/drawingml/2011/main" xmlns="" val="1"/>
+              <ma14:wrappingTextBoxFlag xmlns="" xmlns:ma14="http://schemas.microsoft.com/office/mac/drawingml/2011/main" val="1"/>
             </a:ext>
           </a:extLst>
         </p:spPr>
@@ -19611,7 +19611,7 @@
           </a:ln>
           <a:extLst>
             <a:ext uri="{C572A759-6A51-4108-AA02-DFA0A04FC94B}">
-              <ma14:wrappingTextBoxFlag xmlns:ma14="http://schemas.microsoft.com/office/mac/drawingml/2011/main" xmlns="" val="1"/>
+              <ma14:wrappingTextBoxFlag xmlns="" xmlns:ma14="http://schemas.microsoft.com/office/mac/drawingml/2011/main" val="1"/>
             </a:ext>
           </a:extLst>
         </p:spPr>
@@ -19804,7 +19804,7 @@
           </a:ln>
           <a:extLst>
             <a:ext uri="{C572A759-6A51-4108-AA02-DFA0A04FC94B}">
-              <ma14:wrappingTextBoxFlag xmlns:ma14="http://schemas.microsoft.com/office/mac/drawingml/2011/main" xmlns="" val="1"/>
+              <ma14:wrappingTextBoxFlag xmlns="" xmlns:ma14="http://schemas.microsoft.com/office/mac/drawingml/2011/main" val="1"/>
             </a:ext>
           </a:extLst>
         </p:spPr>
@@ -19897,7 +19897,7 @@
           </a:ln>
           <a:extLst>
             <a:ext uri="{C572A759-6A51-4108-AA02-DFA0A04FC94B}">
-              <ma14:wrappingTextBoxFlag xmlns:ma14="http://schemas.microsoft.com/office/mac/drawingml/2011/main" xmlns="" val="1"/>
+              <ma14:wrappingTextBoxFlag xmlns="" xmlns:ma14="http://schemas.microsoft.com/office/mac/drawingml/2011/main" val="1"/>
             </a:ext>
           </a:extLst>
         </p:spPr>
@@ -19944,7 +19944,7 @@
           </a:ln>
           <a:extLst>
             <a:ext uri="{C572A759-6A51-4108-AA02-DFA0A04FC94B}">
-              <ma14:wrappingTextBoxFlag xmlns:ma14="http://schemas.microsoft.com/office/mac/drawingml/2011/main" xmlns="" val="1"/>
+              <ma14:wrappingTextBoxFlag xmlns="" xmlns:ma14="http://schemas.microsoft.com/office/mac/drawingml/2011/main" val="1"/>
             </a:ext>
           </a:extLst>
         </p:spPr>
@@ -19991,7 +19991,7 @@
           </a:ln>
           <a:extLst>
             <a:ext uri="{C572A759-6A51-4108-AA02-DFA0A04FC94B}">
-              <ma14:wrappingTextBoxFlag xmlns:ma14="http://schemas.microsoft.com/office/mac/drawingml/2011/main" xmlns="" val="1"/>
+              <ma14:wrappingTextBoxFlag xmlns="" xmlns:ma14="http://schemas.microsoft.com/office/mac/drawingml/2011/main" val="1"/>
             </a:ext>
           </a:extLst>
         </p:spPr>
@@ -20182,7 +20182,7 @@
           </a:ln>
           <a:extLst>
             <a:ext uri="{C572A759-6A51-4108-AA02-DFA0A04FC94B}">
-              <ma14:wrappingTextBoxFlag xmlns:ma14="http://schemas.microsoft.com/office/mac/drawingml/2011/main" xmlns="" val="1"/>
+              <ma14:wrappingTextBoxFlag xmlns="" xmlns:ma14="http://schemas.microsoft.com/office/mac/drawingml/2011/main" val="1"/>
             </a:ext>
           </a:extLst>
         </p:spPr>
@@ -20389,7 +20389,7 @@
           </a:ln>
           <a:extLst>
             <a:ext uri="{C572A759-6A51-4108-AA02-DFA0A04FC94B}">
-              <ma14:wrappingTextBoxFlag xmlns:ma14="http://schemas.microsoft.com/office/mac/drawingml/2011/main" xmlns="" val="1"/>
+              <ma14:wrappingTextBoxFlag xmlns="" xmlns:ma14="http://schemas.microsoft.com/office/mac/drawingml/2011/main" val="1"/>
             </a:ext>
           </a:extLst>
         </p:spPr>
@@ -20668,7 +20668,7 @@
           </a:ln>
           <a:extLst>
             <a:ext uri="{C572A759-6A51-4108-AA02-DFA0A04FC94B}">
-              <ma14:wrappingTextBoxFlag xmlns:ma14="http://schemas.microsoft.com/office/mac/drawingml/2011/main" xmlns="" val="1"/>
+              <ma14:wrappingTextBoxFlag xmlns="" xmlns:ma14="http://schemas.microsoft.com/office/mac/drawingml/2011/main" val="1"/>
             </a:ext>
           </a:extLst>
         </p:spPr>
@@ -20701,8 +20701,8 @@
         </p:nvSpPr>
         <p:spPr>
           <a:xfrm>
-            <a:off x="2486189" y="5578351"/>
-            <a:ext cx="5729958" cy="927101"/>
+            <a:off x="2486189" y="5575107"/>
+            <a:ext cx="4408258" cy="933589"/>
           </a:xfrm>
           <a:prstGeom prst="rect">
             <a:avLst/>
@@ -20712,7 +20712,7 @@
           </a:ln>
           <a:extLst>
             <a:ext uri="{C572A759-6A51-4108-AA02-DFA0A04FC94B}">
-              <ma14:wrappingTextBoxFlag xmlns:ma14="http://schemas.microsoft.com/office/mac/drawingml/2011/main" xmlns="" val="1"/>
+              <ma14:wrappingTextBoxFlag xmlns="" xmlns:ma14="http://schemas.microsoft.com/office/mac/drawingml/2011/main" val="1"/>
             </a:ext>
           </a:extLst>
         </p:spPr>
@@ -20735,7 +20735,16 @@
           </a:lstStyle>
           <a:p>
             <a:r>
-              <a:t>“first element”</a:t>
+              <a:rPr dirty="0"/>
+              <a:t>“</a:t>
+            </a:r>
+            <a:r>
+              <a:rPr lang="en-US" dirty="0"/>
+              <a:t>zero</a:t>
+            </a:r>
+            <a:r>
+              <a:rPr dirty="0"/>
+              <a:t> element”</a:t>
             </a:r>
           </a:p>
         </p:txBody>
@@ -20870,7 +20879,7 @@
           </a:ln>
           <a:extLst>
             <a:ext uri="{C572A759-6A51-4108-AA02-DFA0A04FC94B}">
-              <ma14:wrappingTextBoxFlag xmlns:ma14="http://schemas.microsoft.com/office/mac/drawingml/2011/main" xmlns="" val="1"/>
+              <ma14:wrappingTextBoxFlag xmlns="" xmlns:ma14="http://schemas.microsoft.com/office/mac/drawingml/2011/main" val="1"/>
             </a:ext>
           </a:extLst>
         </p:spPr>
@@ -20976,7 +20985,7 @@
           </a:ln>
           <a:extLst>
             <a:ext uri="{C572A759-6A51-4108-AA02-DFA0A04FC94B}">
-              <ma14:wrappingTextBoxFlag xmlns:ma14="http://schemas.microsoft.com/office/mac/drawingml/2011/main" xmlns="" val="1"/>
+              <ma14:wrappingTextBoxFlag xmlns="" xmlns:ma14="http://schemas.microsoft.com/office/mac/drawingml/2011/main" val="1"/>
             </a:ext>
           </a:extLst>
         </p:spPr>
@@ -21069,7 +21078,7 @@
           </a:ln>
           <a:extLst>
             <a:ext uri="{C572A759-6A51-4108-AA02-DFA0A04FC94B}">
-              <ma14:wrappingTextBoxFlag xmlns:ma14="http://schemas.microsoft.com/office/mac/drawingml/2011/main" xmlns="" val="1"/>
+              <ma14:wrappingTextBoxFlag xmlns="" xmlns:ma14="http://schemas.microsoft.com/office/mac/drawingml/2011/main" val="1"/>
             </a:ext>
           </a:extLst>
         </p:spPr>
@@ -21174,7 +21183,7 @@
           </a:ln>
           <a:extLst>
             <a:ext uri="{C572A759-6A51-4108-AA02-DFA0A04FC94B}">
-              <ma14:wrappingTextBoxFlag xmlns:ma14="http://schemas.microsoft.com/office/mac/drawingml/2011/main" xmlns="" val="1"/>
+              <ma14:wrappingTextBoxFlag xmlns="" xmlns:ma14="http://schemas.microsoft.com/office/mac/drawingml/2011/main" val="1"/>
             </a:ext>
           </a:extLst>
         </p:spPr>
@@ -21316,7 +21325,7 @@
           </a:ln>
           <a:extLst>
             <a:ext uri="{C572A759-6A51-4108-AA02-DFA0A04FC94B}">
-              <ma14:wrappingTextBoxFlag xmlns:ma14="http://schemas.microsoft.com/office/mac/drawingml/2011/main" xmlns="" val="1"/>
+              <ma14:wrappingTextBoxFlag xmlns="" xmlns:ma14="http://schemas.microsoft.com/office/mac/drawingml/2011/main" val="1"/>
             </a:ext>
           </a:extLst>
         </p:spPr>
@@ -21419,7 +21428,7 @@
           </a:ln>
           <a:extLst>
             <a:ext uri="{C572A759-6A51-4108-AA02-DFA0A04FC94B}">
-              <ma14:wrappingTextBoxFlag xmlns:ma14="http://schemas.microsoft.com/office/mac/drawingml/2011/main" xmlns="" val="1"/>
+              <ma14:wrappingTextBoxFlag xmlns="" xmlns:ma14="http://schemas.microsoft.com/office/mac/drawingml/2011/main" val="1"/>
             </a:ext>
           </a:extLst>
         </p:spPr>

</xml_diff>